<commit_message>
change in rho_dp ppt
change in rho_dp ppt
</commit_message>
<xml_diff>
--- a/images/rho_dp.pptx
+++ b/images/rho_dp.pptx
@@ -259,7 +259,7 @@
           <a:p>
             <a:fld id="{C7BB4A2B-C640-DD49-ABB6-DD747B915ADF}" type="datetimeFigureOut">
               <a:rPr kumimoji="1" lang="zh-CN" altLang="en-US" smtClean="0"/>
-              <a:t>2024/4/25</a:t>
+              <a:t>2024/4/26</a:t>
             </a:fld>
             <a:endParaRPr kumimoji="1" lang="zh-CN" altLang="en-US"/>
           </a:p>
@@ -457,7 +457,7 @@
           <a:p>
             <a:fld id="{C7BB4A2B-C640-DD49-ABB6-DD747B915ADF}" type="datetimeFigureOut">
               <a:rPr kumimoji="1" lang="zh-CN" altLang="en-US" smtClean="0"/>
-              <a:t>2024/4/25</a:t>
+              <a:t>2024/4/26</a:t>
             </a:fld>
             <a:endParaRPr kumimoji="1" lang="zh-CN" altLang="en-US"/>
           </a:p>
@@ -665,7 +665,7 @@
           <a:p>
             <a:fld id="{C7BB4A2B-C640-DD49-ABB6-DD747B915ADF}" type="datetimeFigureOut">
               <a:rPr kumimoji="1" lang="zh-CN" altLang="en-US" smtClean="0"/>
-              <a:t>2024/4/25</a:t>
+              <a:t>2024/4/26</a:t>
             </a:fld>
             <a:endParaRPr kumimoji="1" lang="zh-CN" altLang="en-US"/>
           </a:p>
@@ -863,7 +863,7 @@
           <a:p>
             <a:fld id="{C7BB4A2B-C640-DD49-ABB6-DD747B915ADF}" type="datetimeFigureOut">
               <a:rPr kumimoji="1" lang="zh-CN" altLang="en-US" smtClean="0"/>
-              <a:t>2024/4/25</a:t>
+              <a:t>2024/4/26</a:t>
             </a:fld>
             <a:endParaRPr kumimoji="1" lang="zh-CN" altLang="en-US"/>
           </a:p>
@@ -1138,7 +1138,7 @@
           <a:p>
             <a:fld id="{C7BB4A2B-C640-DD49-ABB6-DD747B915ADF}" type="datetimeFigureOut">
               <a:rPr kumimoji="1" lang="zh-CN" altLang="en-US" smtClean="0"/>
-              <a:t>2024/4/25</a:t>
+              <a:t>2024/4/26</a:t>
             </a:fld>
             <a:endParaRPr kumimoji="1" lang="zh-CN" altLang="en-US"/>
           </a:p>
@@ -1403,7 +1403,7 @@
           <a:p>
             <a:fld id="{C7BB4A2B-C640-DD49-ABB6-DD747B915ADF}" type="datetimeFigureOut">
               <a:rPr kumimoji="1" lang="zh-CN" altLang="en-US" smtClean="0"/>
-              <a:t>2024/4/25</a:t>
+              <a:t>2024/4/26</a:t>
             </a:fld>
             <a:endParaRPr kumimoji="1" lang="zh-CN" altLang="en-US"/>
           </a:p>
@@ -1815,7 +1815,7 @@
           <a:p>
             <a:fld id="{C7BB4A2B-C640-DD49-ABB6-DD747B915ADF}" type="datetimeFigureOut">
               <a:rPr kumimoji="1" lang="zh-CN" altLang="en-US" smtClean="0"/>
-              <a:t>2024/4/25</a:t>
+              <a:t>2024/4/26</a:t>
             </a:fld>
             <a:endParaRPr kumimoji="1" lang="zh-CN" altLang="en-US"/>
           </a:p>
@@ -1956,7 +1956,7 @@
           <a:p>
             <a:fld id="{C7BB4A2B-C640-DD49-ABB6-DD747B915ADF}" type="datetimeFigureOut">
               <a:rPr kumimoji="1" lang="zh-CN" altLang="en-US" smtClean="0"/>
-              <a:t>2024/4/25</a:t>
+              <a:t>2024/4/26</a:t>
             </a:fld>
             <a:endParaRPr kumimoji="1" lang="zh-CN" altLang="en-US"/>
           </a:p>
@@ -2069,7 +2069,7 @@
           <a:p>
             <a:fld id="{C7BB4A2B-C640-DD49-ABB6-DD747B915ADF}" type="datetimeFigureOut">
               <a:rPr kumimoji="1" lang="zh-CN" altLang="en-US" smtClean="0"/>
-              <a:t>2024/4/25</a:t>
+              <a:t>2024/4/26</a:t>
             </a:fld>
             <a:endParaRPr kumimoji="1" lang="zh-CN" altLang="en-US"/>
           </a:p>
@@ -2380,7 +2380,7 @@
           <a:p>
             <a:fld id="{C7BB4A2B-C640-DD49-ABB6-DD747B915ADF}" type="datetimeFigureOut">
               <a:rPr kumimoji="1" lang="zh-CN" altLang="en-US" smtClean="0"/>
-              <a:t>2024/4/25</a:t>
+              <a:t>2024/4/26</a:t>
             </a:fld>
             <a:endParaRPr kumimoji="1" lang="zh-CN" altLang="en-US"/>
           </a:p>
@@ -2668,7 +2668,7 @@
           <a:p>
             <a:fld id="{C7BB4A2B-C640-DD49-ABB6-DD747B915ADF}" type="datetimeFigureOut">
               <a:rPr kumimoji="1" lang="zh-CN" altLang="en-US" smtClean="0"/>
-              <a:t>2024/4/25</a:t>
+              <a:t>2024/4/26</a:t>
             </a:fld>
             <a:endParaRPr kumimoji="1" lang="zh-CN" altLang="en-US"/>
           </a:p>
@@ -2909,7 +2909,7 @@
           <a:p>
             <a:fld id="{C7BB4A2B-C640-DD49-ABB6-DD747B915ADF}" type="datetimeFigureOut">
               <a:rPr kumimoji="1" lang="zh-CN" altLang="en-US" smtClean="0"/>
-              <a:t>2024/4/25</a:t>
+              <a:t>2024/4/26</a:t>
             </a:fld>
             <a:endParaRPr kumimoji="1" lang="zh-CN" altLang="en-US"/>
           </a:p>
@@ -3328,10 +3328,10 @@
       </p:grpSpPr>
       <p:pic>
         <p:nvPicPr>
-          <p:cNvPr id="6" name="图形 5">
-            <a:extLst>
-              <a:ext uri="{FF2B5EF4-FFF2-40B4-BE49-F238E27FC236}">
-                <a16:creationId xmlns:a16="http://schemas.microsoft.com/office/drawing/2014/main" id="{668EA048-7868-B525-7149-55AC6B8688D4}"/>
+          <p:cNvPr id="14" name="图形 13">
+            <a:extLst>
+              <a:ext uri="{FF2B5EF4-FFF2-40B4-BE49-F238E27FC236}">
+                <a16:creationId xmlns:a16="http://schemas.microsoft.com/office/drawing/2014/main" id="{7F7F0755-77D4-71FB-D872-424A7B26F443}"/>
               </a:ext>
             </a:extLst>
           </p:cNvPr>
@@ -3354,7 +3354,7 @@
         </p:blipFill>
         <p:spPr>
           <a:xfrm>
-            <a:off x="3043570" y="769279"/>
+            <a:off x="3175000" y="1238250"/>
             <a:ext cx="5842000" cy="4381500"/>
           </a:xfrm>
           <a:prstGeom prst="rect">

</xml_diff>